<commit_message>
atividade mapa conceitual sistema computacional 19032023
</commit_message>
<xml_diff>
--- a/01 Classes/Aula0 - Arquitetura de Computadores.pptx
+++ b/01 Classes/Aula0 - Arquitetura de Computadores.pptx
@@ -9421,7 +9421,22 @@
             <a:pPr marL="0" indent="0" algn="just">
               <a:buNone/>
             </a:pPr>
-            <a:endParaRPr lang="pt-BR" sz="2400" dirty="0">
+            <a:r>
+              <a:rPr lang="pt-BR" sz="2000" b="1" dirty="0">
+                <a:solidFill>
+                  <a:srgbClr val="FF0000"/>
+                </a:solidFill>
+                <a:latin typeface="Times New Roman" panose="02020603050405020304" pitchFamily="18" charset="0"/>
+                <a:cs typeface="Times New Roman" panose="02020603050405020304" pitchFamily="18" charset="0"/>
+              </a:rPr>
+              <a:t>Modelo OSI</a:t>
+            </a:r>
+          </a:p>
+          <a:p>
+            <a:pPr marL="0" indent="0" algn="just">
+              <a:buNone/>
+            </a:pPr>
+            <a:endParaRPr lang="pt-BR" sz="2000" dirty="0">
               <a:solidFill>
                 <a:schemeClr val="tx1"/>
               </a:solidFill>
@@ -9433,7 +9448,7 @@
             <a:pPr marL="0" indent="0" algn="just">
               <a:buNone/>
             </a:pPr>
-            <a:endParaRPr lang="pt-BR" sz="2400" dirty="0">
+            <a:endParaRPr lang="pt-BR" sz="2000" dirty="0">
               <a:solidFill>
                 <a:schemeClr val="tx1"/>
               </a:solidFill>
@@ -9446,7 +9461,7 @@
               <a:buNone/>
             </a:pPr>
             <a:r>
-              <a:rPr lang="pt-BR" sz="2400" dirty="0">
+              <a:rPr lang="pt-BR" sz="2000" dirty="0">
                 <a:solidFill>
                   <a:schemeClr val="tx1"/>
                 </a:solidFill>
@@ -9456,19 +9471,7 @@
               </a:rPr>
               <a:t>https://www.alura.com.br/artigos/conhecendo-o-modelo-osi?gclid=CjwKCAjwx7GYBhB7EiwA0d8oezWGDfHnG_n0fJnSpMnHL4n5XmTVZVF-wbbaMystm-vXLA7TZrC3VBoCrFMQAvD_BwE</a:t>
             </a:r>
-            <a:endParaRPr lang="pt-BR" sz="2400" dirty="0">
-              <a:solidFill>
-                <a:schemeClr val="tx1"/>
-              </a:solidFill>
-              <a:latin typeface="Times New Roman" panose="02020603050405020304" pitchFamily="18" charset="0"/>
-              <a:cs typeface="Times New Roman" panose="02020603050405020304" pitchFamily="18" charset="0"/>
-            </a:endParaRPr>
-          </a:p>
-          <a:p>
-            <a:pPr marL="0" indent="0" algn="just">
-              <a:buNone/>
-            </a:pPr>
-            <a:endParaRPr lang="pt-BR" sz="2400" dirty="0">
+            <a:endParaRPr lang="pt-BR" sz="2000" dirty="0">
               <a:solidFill>
                 <a:schemeClr val="tx1"/>
               </a:solidFill>
@@ -10243,15 +10246,26 @@
                 <a:latin typeface="Times New Roman" panose="02020603050405020304" pitchFamily="18" charset="0"/>
                 <a:cs typeface="Times New Roman" panose="02020603050405020304" pitchFamily="18" charset="0"/>
               </a:rPr>
-              <a:t>	Quis (</a:t>
+              <a:t>	Quiz (</a:t>
             </a:r>
             <a:r>
               <a:rPr lang="pt-BR" b="1" dirty="0">
                 <a:latin typeface="Times New Roman" panose="02020603050405020304" pitchFamily="18" charset="0"/>
                 <a:cs typeface="Times New Roman" panose="02020603050405020304" pitchFamily="18" charset="0"/>
               </a:rPr>
-              <a:t>5 perguntas)</a:t>
-            </a:r>
+              <a:t>05 perguntas</a:t>
+            </a:r>
+            <a:r>
+              <a:rPr lang="pt-BR" b="1">
+                <a:latin typeface="Times New Roman" panose="02020603050405020304" pitchFamily="18" charset="0"/>
+                <a:cs typeface="Times New Roman" panose="02020603050405020304" pitchFamily="18" charset="0"/>
+              </a:rPr>
+              <a:t>/respostas)</a:t>
+            </a:r>
+            <a:endParaRPr lang="pt-BR" b="1" dirty="0">
+              <a:latin typeface="Times New Roman" panose="02020603050405020304" pitchFamily="18" charset="0"/>
+              <a:cs typeface="Times New Roman" panose="02020603050405020304" pitchFamily="18" charset="0"/>
+            </a:endParaRPr>
           </a:p>
           <a:p>
             <a:pPr algn="just">

</xml_diff>